<commit_message>
add modal, alert dialog
</commit_message>
<xml_diff>
--- a/Docs/Navigation With Shell Step 2.pptx
+++ b/Docs/Navigation With Shell Step 2.pptx
@@ -5,7 +5,7 @@
     <p:sldMasterId id="2147483715" r:id="rId4"/>
   </p:sldMasterIdLst>
   <p:notesMasterIdLst>
-    <p:notesMasterId r:id="rId11"/>
+    <p:notesMasterId r:id="rId14"/>
   </p:notesMasterIdLst>
   <p:sldIdLst>
     <p:sldId id="1955" r:id="rId5"/>
@@ -13,7 +13,10 @@
     <p:sldId id="1996" r:id="rId7"/>
     <p:sldId id="1997" r:id="rId8"/>
     <p:sldId id="1998" r:id="rId9"/>
-    <p:sldId id="1992" r:id="rId10"/>
+    <p:sldId id="2000" r:id="rId10"/>
+    <p:sldId id="2001" r:id="rId11"/>
+    <p:sldId id="1992" r:id="rId12"/>
+    <p:sldId id="1999" r:id="rId13"/>
   </p:sldIdLst>
   <p:sldSz cx="12192000" cy="6858000"/>
   <p:notesSz cx="6858000" cy="9144000"/>
@@ -122,7 +125,10 @@
             <p14:sldId id="1996"/>
             <p14:sldId id="1997"/>
             <p14:sldId id="1998"/>
+            <p14:sldId id="2000"/>
+            <p14:sldId id="2001"/>
             <p14:sldId id="1992"/>
+            <p14:sldId id="1999"/>
           </p14:sldIdLst>
         </p14:section>
       </p14:sectionLst>
@@ -144,14 +150,6 @@
     </p:extLst>
   </p:cmAuthor>
 </p:cmAuthorLst>
-</file>
-
-<file path=ppt/revisionInfo.xml><?xml version="1.0" encoding="utf-8"?>
-<p1510:revInfo xmlns:a="http://schemas.openxmlformats.org/drawingml/2006/main" xmlns:r="http://schemas.openxmlformats.org/officeDocument/2006/relationships" xmlns:p1510="http://schemas.microsoft.com/office/powerpoint/2015/10/main">
-  <p1510:revLst>
-    <p1510:client id="{D6944E5A-F80B-4E16-8360-36A7472AE177}" v="1" dt="2024-02-07T11:05:49.303"/>
-  </p1510:revLst>
-</p1510:revInfo>
 </file>
 
 <file path=ppt/changesInfos/changesInfo1.xml><?xml version="1.0" encoding="utf-8"?>
@@ -863,6 +861,188 @@
       </pc:sldChg>
     </pc:docChg>
   </pc:docChgLst>
+  <pc:docChgLst>
+    <pc:chgData name="Ofer Zadikario" userId="f36b4b4543f14e71" providerId="LiveId" clId="{769263D5-E35C-443B-B63A-0C95D616B92F}"/>
+    <pc:docChg chg="undo custSel addSld modSld modSection">
+      <pc:chgData name="Ofer Zadikario" userId="f36b4b4543f14e71" providerId="LiveId" clId="{769263D5-E35C-443B-B63A-0C95D616B92F}" dt="2024-02-26T10:01:45.714" v="735" actId="20577"/>
+      <pc:docMkLst>
+        <pc:docMk/>
+      </pc:docMkLst>
+      <pc:sldChg chg="delSp modSp add mod">
+        <pc:chgData name="Ofer Zadikario" userId="f36b4b4543f14e71" providerId="LiveId" clId="{769263D5-E35C-443B-B63A-0C95D616B92F}" dt="2024-02-26T10:01:45.714" v="735" actId="20577"/>
+        <pc:sldMkLst>
+          <pc:docMk/>
+          <pc:sldMk cId="3274342029" sldId="1999"/>
+        </pc:sldMkLst>
+        <pc:spChg chg="mod">
+          <ac:chgData name="Ofer Zadikario" userId="f36b4b4543f14e71" providerId="LiveId" clId="{769263D5-E35C-443B-B63A-0C95D616B92F}" dt="2024-02-26T10:01:45.714" v="735" actId="20577"/>
+          <ac:spMkLst>
+            <pc:docMk/>
+            <pc:sldMk cId="3274342029" sldId="1999"/>
+            <ac:spMk id="2" creationId="{44F24060-04F4-955B-6030-13BF725E253A}"/>
+          </ac:spMkLst>
+        </pc:spChg>
+        <pc:spChg chg="mod">
+          <ac:chgData name="Ofer Zadikario" userId="f36b4b4543f14e71" providerId="LiveId" clId="{769263D5-E35C-443B-B63A-0C95D616B92F}" dt="2024-02-26T09:37:15.306" v="386"/>
+          <ac:spMkLst>
+            <pc:docMk/>
+            <pc:sldMk cId="3274342029" sldId="1999"/>
+            <ac:spMk id="3" creationId="{71BF259A-7A01-81F8-BF24-7A9561B15619}"/>
+          </ac:spMkLst>
+        </pc:spChg>
+        <pc:picChg chg="del">
+          <ac:chgData name="Ofer Zadikario" userId="f36b4b4543f14e71" providerId="LiveId" clId="{769263D5-E35C-443B-B63A-0C95D616B92F}" dt="2024-02-26T09:34:08.364" v="295" actId="478"/>
+          <ac:picMkLst>
+            <pc:docMk/>
+            <pc:sldMk cId="3274342029" sldId="1999"/>
+            <ac:picMk id="5" creationId="{B233A9A4-03D4-B25F-38C5-0F42EA39399C}"/>
+          </ac:picMkLst>
+        </pc:picChg>
+        <pc:picChg chg="del">
+          <ac:chgData name="Ofer Zadikario" userId="f36b4b4543f14e71" providerId="LiveId" clId="{769263D5-E35C-443B-B63A-0C95D616B92F}" dt="2024-02-26T09:34:10.073" v="296" actId="478"/>
+          <ac:picMkLst>
+            <pc:docMk/>
+            <pc:sldMk cId="3274342029" sldId="1999"/>
+            <ac:picMk id="7" creationId="{E2C9A62D-3F0C-BA4D-7B11-C3AECD2FE2F8}"/>
+          </ac:picMkLst>
+        </pc:picChg>
+        <pc:picChg chg="del">
+          <ac:chgData name="Ofer Zadikario" userId="f36b4b4543f14e71" providerId="LiveId" clId="{769263D5-E35C-443B-B63A-0C95D616B92F}" dt="2024-02-26T09:34:11.835" v="297" actId="478"/>
+          <ac:picMkLst>
+            <pc:docMk/>
+            <pc:sldMk cId="3274342029" sldId="1999"/>
+            <ac:picMk id="10" creationId="{7D763821-3585-EE0B-3327-60832B3CD28C}"/>
+          </ac:picMkLst>
+        </pc:picChg>
+        <pc:picChg chg="del">
+          <ac:chgData name="Ofer Zadikario" userId="f36b4b4543f14e71" providerId="LiveId" clId="{769263D5-E35C-443B-B63A-0C95D616B92F}" dt="2024-02-26T09:34:13.628" v="298" actId="478"/>
+          <ac:picMkLst>
+            <pc:docMk/>
+            <pc:sldMk cId="3274342029" sldId="1999"/>
+            <ac:picMk id="12" creationId="{2A33F4E6-6302-1867-F6A5-139933F1A806}"/>
+          </ac:picMkLst>
+        </pc:picChg>
+      </pc:sldChg>
+      <pc:sldChg chg="addSp delSp modSp add mod">
+        <pc:chgData name="Ofer Zadikario" userId="f36b4b4543f14e71" providerId="LiveId" clId="{769263D5-E35C-443B-B63A-0C95D616B92F}" dt="2024-02-26T09:58:14.528" v="418" actId="1076"/>
+        <pc:sldMkLst>
+          <pc:docMk/>
+          <pc:sldMk cId="1632254367" sldId="2000"/>
+        </pc:sldMkLst>
+        <pc:spChg chg="mod">
+          <ac:chgData name="Ofer Zadikario" userId="f36b4b4543f14e71" providerId="LiveId" clId="{769263D5-E35C-443B-B63A-0C95D616B92F}" dt="2024-02-26T09:58:07.906" v="415" actId="1076"/>
+          <ac:spMkLst>
+            <pc:docMk/>
+            <pc:sldMk cId="1632254367" sldId="2000"/>
+            <ac:spMk id="2" creationId="{69BBD479-83E9-4912-FED9-CEBA984F5006}"/>
+          </ac:spMkLst>
+        </pc:spChg>
+        <pc:picChg chg="add mod">
+          <ac:chgData name="Ofer Zadikario" userId="f36b4b4543f14e71" providerId="LiveId" clId="{769263D5-E35C-443B-B63A-0C95D616B92F}" dt="2024-02-26T09:58:14.528" v="418" actId="1076"/>
+          <ac:picMkLst>
+            <pc:docMk/>
+            <pc:sldMk cId="1632254367" sldId="2000"/>
+            <ac:picMk id="5" creationId="{6AE23C6C-308A-53F7-D2C1-193A088A30B7}"/>
+          </ac:picMkLst>
+        </pc:picChg>
+        <pc:picChg chg="del">
+          <ac:chgData name="Ofer Zadikario" userId="f36b4b4543f14e71" providerId="LiveId" clId="{769263D5-E35C-443B-B63A-0C95D616B92F}" dt="2024-02-26T09:58:01.025" v="412" actId="478"/>
+          <ac:picMkLst>
+            <pc:docMk/>
+            <pc:sldMk cId="1632254367" sldId="2000"/>
+            <ac:picMk id="7" creationId="{23627598-D366-D857-4D57-F4B8BE68C77E}"/>
+          </ac:picMkLst>
+        </pc:picChg>
+        <pc:inkChg chg="del">
+          <ac:chgData name="Ofer Zadikario" userId="f36b4b4543f14e71" providerId="LiveId" clId="{769263D5-E35C-443B-B63A-0C95D616B92F}" dt="2024-02-26T09:58:10.750" v="416" actId="478"/>
+          <ac:inkMkLst>
+            <pc:docMk/>
+            <pc:sldMk cId="1632254367" sldId="2000"/>
+            <ac:inkMk id="10" creationId="{7559D09C-B27D-13C5-1952-73F2C164818D}"/>
+          </ac:inkMkLst>
+        </pc:inkChg>
+        <pc:inkChg chg="del">
+          <ac:chgData name="Ofer Zadikario" userId="f36b4b4543f14e71" providerId="LiveId" clId="{769263D5-E35C-443B-B63A-0C95D616B92F}" dt="2024-02-26T09:58:10.750" v="416" actId="478"/>
+          <ac:inkMkLst>
+            <pc:docMk/>
+            <pc:sldMk cId="1632254367" sldId="2000"/>
+            <ac:inkMk id="11" creationId="{278867D3-3BBC-4D5F-B7FD-82721A8E6AFD}"/>
+          </ac:inkMkLst>
+        </pc:inkChg>
+        <pc:inkChg chg="del">
+          <ac:chgData name="Ofer Zadikario" userId="f36b4b4543f14e71" providerId="LiveId" clId="{769263D5-E35C-443B-B63A-0C95D616B92F}" dt="2024-02-26T09:58:04.658" v="413" actId="478"/>
+          <ac:inkMkLst>
+            <pc:docMk/>
+            <pc:sldMk cId="1632254367" sldId="2000"/>
+            <ac:inkMk id="12" creationId="{DE0BF1F6-2833-B1D0-B73F-182C98CB8E89}"/>
+          </ac:inkMkLst>
+        </pc:inkChg>
+      </pc:sldChg>
+      <pc:sldChg chg="addSp delSp modSp add mod">
+        <pc:chgData name="Ofer Zadikario" userId="f36b4b4543f14e71" providerId="LiveId" clId="{769263D5-E35C-443B-B63A-0C95D616B92F}" dt="2024-02-26T10:01:08.782" v="733" actId="1038"/>
+        <pc:sldMkLst>
+          <pc:docMk/>
+          <pc:sldMk cId="1459208649" sldId="2001"/>
+        </pc:sldMkLst>
+        <pc:spChg chg="mod">
+          <ac:chgData name="Ofer Zadikario" userId="f36b4b4543f14e71" providerId="LiveId" clId="{769263D5-E35C-443B-B63A-0C95D616B92F}" dt="2024-02-26T09:59:37.026" v="516" actId="20577"/>
+          <ac:spMkLst>
+            <pc:docMk/>
+            <pc:sldMk cId="1459208649" sldId="2001"/>
+            <ac:spMk id="2" creationId="{AB949F61-D317-A430-0261-FBC4EC8A7FE3}"/>
+          </ac:spMkLst>
+        </pc:spChg>
+        <pc:picChg chg="del">
+          <ac:chgData name="Ofer Zadikario" userId="f36b4b4543f14e71" providerId="LiveId" clId="{769263D5-E35C-443B-B63A-0C95D616B92F}" dt="2024-02-26T10:01:02.129" v="630" actId="478"/>
+          <ac:picMkLst>
+            <pc:docMk/>
+            <pc:sldMk cId="1459208649" sldId="2001"/>
+            <ac:picMk id="4" creationId="{C0A39B59-F46D-8E19-4744-E5C4F6F14645}"/>
+          </ac:picMkLst>
+        </pc:picChg>
+        <pc:picChg chg="del">
+          <ac:chgData name="Ofer Zadikario" userId="f36b4b4543f14e71" providerId="LiveId" clId="{769263D5-E35C-443B-B63A-0C95D616B92F}" dt="2024-02-26T09:58:43.654" v="432" actId="478"/>
+          <ac:picMkLst>
+            <pc:docMk/>
+            <pc:sldMk cId="1459208649" sldId="2001"/>
+            <ac:picMk id="5" creationId="{DB1C0387-CDD6-00A4-2DAA-B47DA5817AD6}"/>
+          </ac:picMkLst>
+        </pc:picChg>
+        <pc:picChg chg="add mod">
+          <ac:chgData name="Ofer Zadikario" userId="f36b4b4543f14e71" providerId="LiveId" clId="{769263D5-E35C-443B-B63A-0C95D616B92F}" dt="2024-02-26T09:59:32.073" v="514" actId="1035"/>
+          <ac:picMkLst>
+            <pc:docMk/>
+            <pc:sldMk cId="1459208649" sldId="2001"/>
+            <ac:picMk id="6" creationId="{A392FD42-29F7-7F49-CD5F-A3DE5CD2DB28}"/>
+          </ac:picMkLst>
+        </pc:picChg>
+        <pc:picChg chg="add mod">
+          <ac:chgData name="Ofer Zadikario" userId="f36b4b4543f14e71" providerId="LiveId" clId="{769263D5-E35C-443B-B63A-0C95D616B92F}" dt="2024-02-26T10:00:03.209" v="518" actId="1076"/>
+          <ac:picMkLst>
+            <pc:docMk/>
+            <pc:sldMk cId="1459208649" sldId="2001"/>
+            <ac:picMk id="9" creationId="{D2128614-77CB-7352-440F-97B89C0DED6F}"/>
+          </ac:picMkLst>
+        </pc:picChg>
+        <pc:picChg chg="add mod">
+          <ac:chgData name="Ofer Zadikario" userId="f36b4b4543f14e71" providerId="LiveId" clId="{769263D5-E35C-443B-B63A-0C95D616B92F}" dt="2024-02-26T10:00:30.159" v="629" actId="1038"/>
+          <ac:picMkLst>
+            <pc:docMk/>
+            <pc:sldMk cId="1459208649" sldId="2001"/>
+            <ac:picMk id="11" creationId="{EA012DD6-ABAB-817E-A986-A161A5834018}"/>
+          </ac:picMkLst>
+        </pc:picChg>
+        <pc:picChg chg="add mod">
+          <ac:chgData name="Ofer Zadikario" userId="f36b4b4543f14e71" providerId="LiveId" clId="{769263D5-E35C-443B-B63A-0C95D616B92F}" dt="2024-02-26T10:01:08.782" v="733" actId="1038"/>
+          <ac:picMkLst>
+            <pc:docMk/>
+            <pc:sldMk cId="1459208649" sldId="2001"/>
+            <ac:picMk id="13" creationId="{67A057E2-6338-6122-2A50-C704F59F8327}"/>
+          </ac:picMkLst>
+        </pc:picChg>
+      </pc:sldChg>
+    </pc:docChg>
+  </pc:docChgLst>
 </pc:chgInfo>
 </file>
 
@@ -1064,7 +1244,7 @@
           <a:p>
             <a:fld id="{18438622-0837-4E9E-A16C-0B0206CE676E}" type="datetimeFigureOut">
               <a:rPr lang="en-US" smtClean="0"/>
-              <a:t>2/16/2024</a:t>
+              <a:t>2/26/2024</a:t>
             </a:fld>
             <a:endParaRPr lang="en-US"/>
           </a:p>
@@ -1469,7 +1649,7 @@
           <a:p>
             <a:fld id="{D18B56EA-E28F-4F92-9F16-7A6F2501B303}" type="datetime8">
               <a:rPr lang="en-US" smtClean="0"/>
-              <a:t>2/16/2024 2:45 PM</a:t>
+              <a:t>2/26/2024 11:31 AM</a:t>
             </a:fld>
             <a:endParaRPr lang="en-US" dirty="0"/>
           </a:p>
@@ -6900,8 +7080,8 @@
           </a:prstGeom>
         </p:spPr>
       </p:pic>
-      <mc:AlternateContent xmlns:mc="http://schemas.openxmlformats.org/markup-compatibility/2006">
-        <mc:Choice xmlns:p14="http://schemas.microsoft.com/office/powerpoint/2010/main" Requires="p14">
+      <mc:AlternateContent xmlns:mc="http://schemas.openxmlformats.org/markup-compatibility/2006" xmlns:p14="http://schemas.microsoft.com/office/powerpoint/2010/main">
+        <mc:Choice Requires="p14">
           <p:contentPart p14:bwMode="auto" r:id="rId4">
             <p14:nvContentPartPr>
               <p14:cNvPr id="10" name="Ink 9">
@@ -6920,7 +7100,7 @@
             </p14:xfrm>
           </p:contentPart>
         </mc:Choice>
-        <mc:Fallback>
+        <mc:Fallback xmlns="">
           <p:pic>
             <p:nvPicPr>
               <p:cNvPr id="10" name="Ink 9">
@@ -7068,8 +7248,8 @@
           </a:p>
         </p:txBody>
       </p:sp>
-      <mc:AlternateContent xmlns:mc="http://schemas.openxmlformats.org/markup-compatibility/2006">
-        <mc:Choice xmlns:p14="http://schemas.microsoft.com/office/powerpoint/2010/main" Requires="p14">
+      <mc:AlternateContent xmlns:mc="http://schemas.openxmlformats.org/markup-compatibility/2006" xmlns:p14="http://schemas.microsoft.com/office/powerpoint/2010/main">
+        <mc:Choice Requires="p14">
           <p:contentPart p14:bwMode="auto" r:id="rId2">
             <p14:nvContentPartPr>
               <p14:cNvPr id="10" name="Ink 9">
@@ -7088,7 +7268,7 @@
             </p14:xfrm>
           </p:contentPart>
         </mc:Choice>
-        <mc:Fallback>
+        <mc:Fallback xmlns="">
           <p:pic>
             <p:nvPicPr>
               <p:cNvPr id="10" name="Ink 9">
@@ -7179,8 +7359,8 @@
           </a:prstGeom>
         </p:spPr>
       </p:pic>
-      <mc:AlternateContent xmlns:mc="http://schemas.openxmlformats.org/markup-compatibility/2006">
-        <mc:Choice xmlns:p14="http://schemas.microsoft.com/office/powerpoint/2010/main" Requires="p14">
+      <mc:AlternateContent xmlns:mc="http://schemas.openxmlformats.org/markup-compatibility/2006" xmlns:p14="http://schemas.microsoft.com/office/powerpoint/2010/main">
+        <mc:Choice Requires="p14">
           <p:contentPart p14:bwMode="auto" r:id="rId6">
             <p14:nvContentPartPr>
               <p14:cNvPr id="11" name="Ink 10">
@@ -7199,7 +7379,7 @@
             </p14:xfrm>
           </p:contentPart>
         </mc:Choice>
-        <mc:Fallback>
+        <mc:Fallback xmlns="">
           <p:pic>
             <p:nvPicPr>
               <p:cNvPr id="11" name="Ink 10">
@@ -7230,8 +7410,8 @@
           </p:pic>
         </mc:Fallback>
       </mc:AlternateContent>
-      <mc:AlternateContent xmlns:mc="http://schemas.openxmlformats.org/markup-compatibility/2006">
-        <mc:Choice xmlns:p14="http://schemas.microsoft.com/office/powerpoint/2010/main" Requires="p14">
+      <mc:AlternateContent xmlns:mc="http://schemas.openxmlformats.org/markup-compatibility/2006" xmlns:p14="http://schemas.microsoft.com/office/powerpoint/2010/main">
+        <mc:Choice Requires="p14">
           <p:contentPart p14:bwMode="auto" r:id="rId8">
             <p14:nvContentPartPr>
               <p14:cNvPr id="12" name="Ink 11">
@@ -7250,7 +7430,7 @@
             </p14:xfrm>
           </p:contentPart>
         </mc:Choice>
-        <mc:Fallback>
+        <mc:Fallback xmlns="">
           <p:pic>
             <p:nvPicPr>
               <p:cNvPr id="12" name="Ink 11">
@@ -7295,6 +7475,420 @@
 </file>
 
 <file path=ppt/slides/slide6.xml><?xml version="1.0" encoding="utf-8"?>
+<p:sld xmlns:a="http://schemas.openxmlformats.org/drawingml/2006/main" xmlns:r="http://schemas.openxmlformats.org/officeDocument/2006/relationships" xmlns:p="http://schemas.openxmlformats.org/presentationml/2006/main">
+  <p:cSld>
+    <p:spTree>
+      <p:nvGrpSpPr>
+        <p:cNvPr id="1" name="">
+          <a:extLst>
+            <a:ext uri="{FF2B5EF4-FFF2-40B4-BE49-F238E27FC236}">
+              <a16:creationId xmlns:a16="http://schemas.microsoft.com/office/drawing/2014/main" id="{AB9ED7BC-5F44-6945-2624-C6BAC146D536}"/>
+            </a:ext>
+          </a:extLst>
+        </p:cNvPr>
+        <p:cNvGrpSpPr/>
+        <p:nvPr/>
+      </p:nvGrpSpPr>
+      <p:grpSpPr>
+        <a:xfrm>
+          <a:off x="0" y="0"/>
+          <a:ext cx="0" cy="0"/>
+          <a:chOff x="0" y="0"/>
+          <a:chExt cx="0" cy="0"/>
+        </a:xfrm>
+      </p:grpSpPr>
+      <p:sp>
+        <p:nvSpPr>
+          <p:cNvPr id="2" name="כותרת 1">
+            <a:extLst>
+              <a:ext uri="{FF2B5EF4-FFF2-40B4-BE49-F238E27FC236}">
+                <a16:creationId xmlns:a16="http://schemas.microsoft.com/office/drawing/2014/main" id="{69BBD479-83E9-4912-FED9-CEBA984F5006}"/>
+              </a:ext>
+            </a:extLst>
+          </p:cNvPr>
+          <p:cNvSpPr>
+            <a:spLocks noGrp="1"/>
+          </p:cNvSpPr>
+          <p:nvPr>
+            <p:ph type="title"/>
+          </p:nvPr>
+        </p:nvSpPr>
+        <p:spPr/>
+        <p:txBody>
+          <a:bodyPr/>
+          <a:lstStyle/>
+          <a:p>
+            <a:r>
+              <a:rPr lang="en-US" dirty="0"/>
+              <a:t>Opening Alert Dialog</a:t>
+            </a:r>
+            <a:endParaRPr lang="he-IL" dirty="0"/>
+          </a:p>
+        </p:txBody>
+      </p:sp>
+      <p:sp>
+        <p:nvSpPr>
+          <p:cNvPr id="8" name="תיבת טקסט 7">
+            <a:extLst>
+              <a:ext uri="{FF2B5EF4-FFF2-40B4-BE49-F238E27FC236}">
+                <a16:creationId xmlns:a16="http://schemas.microsoft.com/office/drawing/2014/main" id="{AAC07DAC-62B1-025C-142E-BDBE6E7ACF42}"/>
+              </a:ext>
+            </a:extLst>
+          </p:cNvPr>
+          <p:cNvSpPr txBox="1"/>
+          <p:nvPr/>
+        </p:nvSpPr>
+        <p:spPr>
+          <a:xfrm>
+            <a:off x="656985" y="3845859"/>
+            <a:ext cx="11094098" cy="572464"/>
+          </a:xfrm>
+          <a:prstGeom prst="rect">
+            <a:avLst/>
+          </a:prstGeom>
+          <a:noFill/>
+        </p:spPr>
+        <p:txBody>
+          <a:bodyPr wrap="square" lIns="182880" tIns="146304" rIns="182880" bIns="146304" rtlCol="1">
+            <a:spAutoFit/>
+          </a:bodyPr>
+          <a:lstStyle/>
+          <a:p>
+            <a:pPr>
+              <a:lnSpc>
+                <a:spcPct val="90000"/>
+              </a:lnSpc>
+              <a:spcAft>
+                <a:spcPts val="600"/>
+              </a:spcAft>
+            </a:pPr>
+            <a:endParaRPr lang="en-US" sz="2000" dirty="0">
+              <a:gradFill>
+                <a:gsLst>
+                  <a:gs pos="2917">
+                    <a:schemeClr val="tx1"/>
+                  </a:gs>
+                  <a:gs pos="30000">
+                    <a:schemeClr val="tx1"/>
+                  </a:gs>
+                </a:gsLst>
+                <a:lin ang="5400000" scaled="0"/>
+              </a:gradFill>
+            </a:endParaRPr>
+          </a:p>
+        </p:txBody>
+      </p:sp>
+      <p:pic>
+        <p:nvPicPr>
+          <p:cNvPr id="4" name="Picture 3">
+            <a:extLst>
+              <a:ext uri="{FF2B5EF4-FFF2-40B4-BE49-F238E27FC236}">
+                <a16:creationId xmlns:a16="http://schemas.microsoft.com/office/drawing/2014/main" id="{C6FF6BA1-06FA-C75C-AF6A-10CAB85D0DC3}"/>
+              </a:ext>
+            </a:extLst>
+          </p:cNvPr>
+          <p:cNvPicPr>
+            <a:picLocks noChangeAspect="1"/>
+          </p:cNvPicPr>
+          <p:nvPr/>
+        </p:nvPicPr>
+        <p:blipFill>
+          <a:blip r:embed="rId2"/>
+          <a:stretch>
+            <a:fillRect/>
+          </a:stretch>
+        </p:blipFill>
+        <p:spPr>
+          <a:xfrm>
+            <a:off x="8156171" y="0"/>
+            <a:ext cx="3243943" cy="6858000"/>
+          </a:xfrm>
+          <a:prstGeom prst="rect">
+            <a:avLst/>
+          </a:prstGeom>
+        </p:spPr>
+      </p:pic>
+      <p:pic>
+        <p:nvPicPr>
+          <p:cNvPr id="5" name="Picture 4">
+            <a:extLst>
+              <a:ext uri="{FF2B5EF4-FFF2-40B4-BE49-F238E27FC236}">
+                <a16:creationId xmlns:a16="http://schemas.microsoft.com/office/drawing/2014/main" id="{6AE23C6C-308A-53F7-D2C1-193A088A30B7}"/>
+              </a:ext>
+            </a:extLst>
+          </p:cNvPr>
+          <p:cNvPicPr>
+            <a:picLocks noChangeAspect="1"/>
+          </p:cNvPicPr>
+          <p:nvPr/>
+        </p:nvPicPr>
+        <p:blipFill>
+          <a:blip r:embed="rId3"/>
+          <a:stretch>
+            <a:fillRect/>
+          </a:stretch>
+        </p:blipFill>
+        <p:spPr>
+          <a:xfrm>
+            <a:off x="287893" y="2403448"/>
+            <a:ext cx="7525137" cy="1866996"/>
+          </a:xfrm>
+          <a:prstGeom prst="rect">
+            <a:avLst/>
+          </a:prstGeom>
+        </p:spPr>
+      </p:pic>
+    </p:spTree>
+    <p:extLst>
+      <p:ext uri="{BB962C8B-B14F-4D97-AF65-F5344CB8AC3E}">
+        <p14:creationId xmlns:p14="http://schemas.microsoft.com/office/powerpoint/2010/main" val="1632254367"/>
+      </p:ext>
+    </p:extLst>
+  </p:cSld>
+  <p:clrMapOvr>
+    <a:masterClrMapping/>
+  </p:clrMapOvr>
+</p:sld>
+</file>
+
+<file path=ppt/slides/slide7.xml><?xml version="1.0" encoding="utf-8"?>
+<p:sld xmlns:a="http://schemas.openxmlformats.org/drawingml/2006/main" xmlns:r="http://schemas.openxmlformats.org/officeDocument/2006/relationships" xmlns:p="http://schemas.openxmlformats.org/presentationml/2006/main">
+  <p:cSld>
+    <p:spTree>
+      <p:nvGrpSpPr>
+        <p:cNvPr id="1" name="">
+          <a:extLst>
+            <a:ext uri="{FF2B5EF4-FFF2-40B4-BE49-F238E27FC236}">
+              <a16:creationId xmlns:a16="http://schemas.microsoft.com/office/drawing/2014/main" id="{4D2D7C95-7B24-5B93-C2B5-C3686298B7F4}"/>
+            </a:ext>
+          </a:extLst>
+        </p:cNvPr>
+        <p:cNvGrpSpPr/>
+        <p:nvPr/>
+      </p:nvGrpSpPr>
+      <p:grpSpPr>
+        <a:xfrm>
+          <a:off x="0" y="0"/>
+          <a:ext cx="0" cy="0"/>
+          <a:chOff x="0" y="0"/>
+          <a:chExt cx="0" cy="0"/>
+        </a:xfrm>
+      </p:grpSpPr>
+      <p:sp>
+        <p:nvSpPr>
+          <p:cNvPr id="2" name="כותרת 1">
+            <a:extLst>
+              <a:ext uri="{FF2B5EF4-FFF2-40B4-BE49-F238E27FC236}">
+                <a16:creationId xmlns:a16="http://schemas.microsoft.com/office/drawing/2014/main" id="{AB949F61-D317-A430-0261-FBC4EC8A7FE3}"/>
+              </a:ext>
+            </a:extLst>
+          </p:cNvPr>
+          <p:cNvSpPr>
+            <a:spLocks noGrp="1"/>
+          </p:cNvSpPr>
+          <p:nvPr>
+            <p:ph type="title"/>
+          </p:nvPr>
+        </p:nvSpPr>
+        <p:spPr/>
+        <p:txBody>
+          <a:bodyPr/>
+          <a:lstStyle/>
+          <a:p>
+            <a:r>
+              <a:rPr lang="en-US" dirty="0"/>
+              <a:t>Modal pages</a:t>
+            </a:r>
+            <a:endParaRPr lang="he-IL" dirty="0"/>
+          </a:p>
+        </p:txBody>
+      </p:sp>
+      <p:sp>
+        <p:nvSpPr>
+          <p:cNvPr id="8" name="תיבת טקסט 7">
+            <a:extLst>
+              <a:ext uri="{FF2B5EF4-FFF2-40B4-BE49-F238E27FC236}">
+                <a16:creationId xmlns:a16="http://schemas.microsoft.com/office/drawing/2014/main" id="{D5D1F152-9734-255F-54DA-FA04E6D0C45F}"/>
+              </a:ext>
+            </a:extLst>
+          </p:cNvPr>
+          <p:cNvSpPr txBox="1"/>
+          <p:nvPr/>
+        </p:nvSpPr>
+        <p:spPr>
+          <a:xfrm>
+            <a:off x="656985" y="3845859"/>
+            <a:ext cx="11094098" cy="572464"/>
+          </a:xfrm>
+          <a:prstGeom prst="rect">
+            <a:avLst/>
+          </a:prstGeom>
+          <a:noFill/>
+        </p:spPr>
+        <p:txBody>
+          <a:bodyPr wrap="square" lIns="182880" tIns="146304" rIns="182880" bIns="146304" rtlCol="1">
+            <a:spAutoFit/>
+          </a:bodyPr>
+          <a:lstStyle/>
+          <a:p>
+            <a:pPr>
+              <a:lnSpc>
+                <a:spcPct val="90000"/>
+              </a:lnSpc>
+              <a:spcAft>
+                <a:spcPts val="600"/>
+              </a:spcAft>
+            </a:pPr>
+            <a:endParaRPr lang="en-US" sz="2000" dirty="0">
+              <a:gradFill>
+                <a:gsLst>
+                  <a:gs pos="2917">
+                    <a:schemeClr val="tx1"/>
+                  </a:gs>
+                  <a:gs pos="30000">
+                    <a:schemeClr val="tx1"/>
+                  </a:gs>
+                </a:gsLst>
+                <a:lin ang="5400000" scaled="0"/>
+              </a:gradFill>
+            </a:endParaRPr>
+          </a:p>
+        </p:txBody>
+      </p:sp>
+      <p:pic>
+        <p:nvPicPr>
+          <p:cNvPr id="6" name="Picture 5">
+            <a:extLst>
+              <a:ext uri="{FF2B5EF4-FFF2-40B4-BE49-F238E27FC236}">
+                <a16:creationId xmlns:a16="http://schemas.microsoft.com/office/drawing/2014/main" id="{A392FD42-29F7-7F49-CD5F-A3DE5CD2DB28}"/>
+              </a:ext>
+            </a:extLst>
+          </p:cNvPr>
+          <p:cNvPicPr>
+            <a:picLocks noChangeAspect="1"/>
+          </p:cNvPicPr>
+          <p:nvPr/>
+        </p:nvPicPr>
+        <p:blipFill>
+          <a:blip r:embed="rId2"/>
+          <a:stretch>
+            <a:fillRect/>
+          </a:stretch>
+        </p:blipFill>
+        <p:spPr>
+          <a:xfrm>
+            <a:off x="316925" y="1529551"/>
+            <a:ext cx="7556888" cy="1282766"/>
+          </a:xfrm>
+          <a:prstGeom prst="rect">
+            <a:avLst/>
+          </a:prstGeom>
+        </p:spPr>
+      </p:pic>
+      <p:pic>
+        <p:nvPicPr>
+          <p:cNvPr id="9" name="Picture 8">
+            <a:extLst>
+              <a:ext uri="{FF2B5EF4-FFF2-40B4-BE49-F238E27FC236}">
+                <a16:creationId xmlns:a16="http://schemas.microsoft.com/office/drawing/2014/main" id="{D2128614-77CB-7352-440F-97B89C0DED6F}"/>
+              </a:ext>
+            </a:extLst>
+          </p:cNvPr>
+          <p:cNvPicPr>
+            <a:picLocks noChangeAspect="1"/>
+          </p:cNvPicPr>
+          <p:nvPr/>
+        </p:nvPicPr>
+        <p:blipFill>
+          <a:blip r:embed="rId3"/>
+          <a:stretch>
+            <a:fillRect/>
+          </a:stretch>
+        </p:blipFill>
+        <p:spPr>
+          <a:xfrm>
+            <a:off x="316925" y="3003402"/>
+            <a:ext cx="6337626" cy="1028753"/>
+          </a:xfrm>
+          <a:prstGeom prst="rect">
+            <a:avLst/>
+          </a:prstGeom>
+        </p:spPr>
+      </p:pic>
+      <p:pic>
+        <p:nvPicPr>
+          <p:cNvPr id="11" name="Picture 10">
+            <a:extLst>
+              <a:ext uri="{FF2B5EF4-FFF2-40B4-BE49-F238E27FC236}">
+                <a16:creationId xmlns:a16="http://schemas.microsoft.com/office/drawing/2014/main" id="{EA012DD6-ABAB-817E-A986-A161A5834018}"/>
+              </a:ext>
+            </a:extLst>
+          </p:cNvPr>
+          <p:cNvPicPr>
+            <a:picLocks noChangeAspect="1"/>
+          </p:cNvPicPr>
+          <p:nvPr/>
+        </p:nvPicPr>
+        <p:blipFill>
+          <a:blip r:embed="rId4"/>
+          <a:stretch>
+            <a:fillRect/>
+          </a:stretch>
+        </p:blipFill>
+        <p:spPr>
+          <a:xfrm>
+            <a:off x="375943" y="4534740"/>
+            <a:ext cx="6236020" cy="1212912"/>
+          </a:xfrm>
+          <a:prstGeom prst="rect">
+            <a:avLst/>
+          </a:prstGeom>
+        </p:spPr>
+      </p:pic>
+      <p:pic>
+        <p:nvPicPr>
+          <p:cNvPr id="13" name="Picture 12">
+            <a:extLst>
+              <a:ext uri="{FF2B5EF4-FFF2-40B4-BE49-F238E27FC236}">
+                <a16:creationId xmlns:a16="http://schemas.microsoft.com/office/drawing/2014/main" id="{67A057E2-6338-6122-2A50-C704F59F8327}"/>
+              </a:ext>
+            </a:extLst>
+          </p:cNvPr>
+          <p:cNvPicPr>
+            <a:picLocks noChangeAspect="1"/>
+          </p:cNvPicPr>
+          <p:nvPr/>
+        </p:nvPicPr>
+        <p:blipFill>
+          <a:blip r:embed="rId5"/>
+          <a:stretch>
+            <a:fillRect/>
+          </a:stretch>
+        </p:blipFill>
+        <p:spPr>
+          <a:xfrm>
+            <a:off x="8918509" y="0"/>
+            <a:ext cx="3216678" cy="6858000"/>
+          </a:xfrm>
+          <a:prstGeom prst="rect">
+            <a:avLst/>
+          </a:prstGeom>
+        </p:spPr>
+      </p:pic>
+    </p:spTree>
+    <p:extLst>
+      <p:ext uri="{BB962C8B-B14F-4D97-AF65-F5344CB8AC3E}">
+        <p14:creationId xmlns:p14="http://schemas.microsoft.com/office/powerpoint/2010/main" val="1459208649"/>
+      </p:ext>
+    </p:extLst>
+  </p:cSld>
+  <p:clrMapOvr>
+    <a:masterClrMapping/>
+  </p:clrMapOvr>
+</p:sld>
+</file>
+
+<file path=ppt/slides/slide8.xml><?xml version="1.0" encoding="utf-8"?>
 <p:sld xmlns:a="http://schemas.openxmlformats.org/drawingml/2006/main" xmlns:r="http://schemas.openxmlformats.org/officeDocument/2006/relationships" xmlns:p="http://schemas.openxmlformats.org/presentationml/2006/main">
   <p:cSld>
     <p:spTree>
@@ -7708,6 +8302,478 @@
     <p:extLst>
       <p:ext uri="{BB962C8B-B14F-4D97-AF65-F5344CB8AC3E}">
         <p14:creationId xmlns:p14="http://schemas.microsoft.com/office/powerpoint/2010/main" val="1178409802"/>
+      </p:ext>
+    </p:extLst>
+  </p:cSld>
+  <p:clrMapOvr>
+    <a:masterClrMapping/>
+  </p:clrMapOvr>
+</p:sld>
+</file>
+
+<file path=ppt/slides/slide9.xml><?xml version="1.0" encoding="utf-8"?>
+<p:sld xmlns:a="http://schemas.openxmlformats.org/drawingml/2006/main" xmlns:r="http://schemas.openxmlformats.org/officeDocument/2006/relationships" xmlns:p="http://schemas.openxmlformats.org/presentationml/2006/main">
+  <p:cSld>
+    <p:spTree>
+      <p:nvGrpSpPr>
+        <p:cNvPr id="1" name="">
+          <a:extLst>
+            <a:ext uri="{FF2B5EF4-FFF2-40B4-BE49-F238E27FC236}">
+              <a16:creationId xmlns:a16="http://schemas.microsoft.com/office/drawing/2014/main" id="{A0D2E728-2E9B-0343-877F-37DEEA8EB3DE}"/>
+            </a:ext>
+          </a:extLst>
+        </p:cNvPr>
+        <p:cNvGrpSpPr/>
+        <p:nvPr/>
+      </p:nvGrpSpPr>
+      <p:grpSpPr>
+        <a:xfrm>
+          <a:off x="0" y="0"/>
+          <a:ext cx="0" cy="0"/>
+          <a:chOff x="0" y="0"/>
+          <a:chExt cx="0" cy="0"/>
+        </a:xfrm>
+      </p:grpSpPr>
+      <p:sp>
+        <p:nvSpPr>
+          <p:cNvPr id="2" name="כותרת 1">
+            <a:extLst>
+              <a:ext uri="{FF2B5EF4-FFF2-40B4-BE49-F238E27FC236}">
+                <a16:creationId xmlns:a16="http://schemas.microsoft.com/office/drawing/2014/main" id="{44F24060-04F4-955B-6030-13BF725E253A}"/>
+              </a:ext>
+            </a:extLst>
+          </p:cNvPr>
+          <p:cNvSpPr>
+            <a:spLocks noGrp="1"/>
+          </p:cNvSpPr>
+          <p:nvPr>
+            <p:ph type="title"/>
+          </p:nvPr>
+        </p:nvSpPr>
+        <p:spPr/>
+        <p:txBody>
+          <a:bodyPr/>
+          <a:lstStyle/>
+          <a:p>
+            <a:r>
+              <a:rPr lang="en-US"/>
+              <a:t>Exercise 2 </a:t>
+            </a:r>
+            <a:r>
+              <a:rPr lang="en-US" dirty="0"/>
+              <a:t>– Preparing the Trivia App Structure</a:t>
+            </a:r>
+            <a:endParaRPr lang="he-IL" dirty="0"/>
+          </a:p>
+        </p:txBody>
+      </p:sp>
+      <p:sp>
+        <p:nvSpPr>
+          <p:cNvPr id="3" name="תיבת טקסט 2">
+            <a:extLst>
+              <a:ext uri="{FF2B5EF4-FFF2-40B4-BE49-F238E27FC236}">
+                <a16:creationId xmlns:a16="http://schemas.microsoft.com/office/drawing/2014/main" id="{71BF259A-7A01-81F8-BF24-7A9561B15619}"/>
+              </a:ext>
+            </a:extLst>
+          </p:cNvPr>
+          <p:cNvSpPr txBox="1"/>
+          <p:nvPr/>
+        </p:nvSpPr>
+        <p:spPr>
+          <a:xfrm>
+            <a:off x="516376" y="954290"/>
+            <a:ext cx="10388917" cy="6404830"/>
+          </a:xfrm>
+          <a:prstGeom prst="rect">
+            <a:avLst/>
+          </a:prstGeom>
+          <a:noFill/>
+        </p:spPr>
+        <p:txBody>
+          <a:bodyPr wrap="square" lIns="182880" tIns="146304" rIns="182880" bIns="146304" rtlCol="1">
+            <a:spAutoFit/>
+          </a:bodyPr>
+          <a:lstStyle/>
+          <a:p>
+            <a:pPr marL="342900" indent="-342900">
+              <a:lnSpc>
+                <a:spcPct val="90000"/>
+              </a:lnSpc>
+              <a:spcAft>
+                <a:spcPts val="600"/>
+              </a:spcAft>
+              <a:buFont typeface="Arial" panose="020B0604020202020204" pitchFamily="34" charset="0"/>
+              <a:buChar char="•"/>
+            </a:pPr>
+            <a:r>
+              <a:rPr lang="en-US" sz="2800" dirty="0">
+                <a:gradFill>
+                  <a:gsLst>
+                    <a:gs pos="2917">
+                      <a:schemeClr val="tx1"/>
+                    </a:gs>
+                    <a:gs pos="30000">
+                      <a:schemeClr val="tx1"/>
+                    </a:gs>
+                  </a:gsLst>
+                  <a:lin ang="5400000" scaled="0"/>
+                </a:gradFill>
+              </a:rPr>
+              <a:t>Create an App structure that will be used for the final exercise – The trivia app!</a:t>
+            </a:r>
+          </a:p>
+          <a:p>
+            <a:pPr marL="342900" indent="-342900">
+              <a:lnSpc>
+                <a:spcPct val="90000"/>
+              </a:lnSpc>
+              <a:spcAft>
+                <a:spcPts val="600"/>
+              </a:spcAft>
+              <a:buFont typeface="Arial" panose="020B0604020202020204" pitchFamily="34" charset="0"/>
+              <a:buChar char="•"/>
+            </a:pPr>
+            <a:r>
+              <a:rPr lang="en-US" sz="2800" dirty="0">
+                <a:gradFill>
+                  <a:gsLst>
+                    <a:gs pos="2917">
+                      <a:schemeClr val="tx1"/>
+                    </a:gs>
+                    <a:gs pos="30000">
+                      <a:schemeClr val="tx1"/>
+                    </a:gs>
+                  </a:gsLst>
+                  <a:lin ang="5400000" scaled="0"/>
+                </a:gradFill>
+              </a:rPr>
+              <a:t>First page to be loaded will be a Login / Registration page. Once this step is over, the user will be directed to the app.</a:t>
+            </a:r>
+          </a:p>
+          <a:p>
+            <a:pPr marL="342900" indent="-342900">
+              <a:lnSpc>
+                <a:spcPct val="90000"/>
+              </a:lnSpc>
+              <a:spcAft>
+                <a:spcPts val="600"/>
+              </a:spcAft>
+              <a:buFont typeface="Arial" panose="020B0604020202020204" pitchFamily="34" charset="0"/>
+              <a:buChar char="•"/>
+            </a:pPr>
+            <a:r>
+              <a:rPr lang="en-US" sz="2800" dirty="0">
+                <a:gradFill>
+                  <a:gsLst>
+                    <a:gs pos="2917">
+                      <a:schemeClr val="tx1"/>
+                    </a:gs>
+                    <a:gs pos="30000">
+                      <a:schemeClr val="tx1"/>
+                    </a:gs>
+                  </a:gsLst>
+                  <a:lin ang="5400000" scaled="0"/>
+                </a:gradFill>
+              </a:rPr>
+              <a:t>On the Flyout menu the following items:</a:t>
+            </a:r>
+          </a:p>
+          <a:p>
+            <a:pPr marL="800100" lvl="1" indent="-342900">
+              <a:lnSpc>
+                <a:spcPct val="90000"/>
+              </a:lnSpc>
+              <a:spcAft>
+                <a:spcPts val="600"/>
+              </a:spcAft>
+              <a:buFont typeface="Arial" panose="020B0604020202020204" pitchFamily="34" charset="0"/>
+              <a:buChar char="•"/>
+            </a:pPr>
+            <a:r>
+              <a:rPr lang="en-US" sz="2800" dirty="0">
+                <a:gradFill>
+                  <a:gsLst>
+                    <a:gs pos="2917">
+                      <a:schemeClr val="tx1"/>
+                    </a:gs>
+                    <a:gs pos="30000">
+                      <a:schemeClr val="tx1"/>
+                    </a:gs>
+                  </a:gsLst>
+                  <a:lin ang="5400000" scaled="0"/>
+                </a:gradFill>
+              </a:rPr>
+              <a:t>Start Game</a:t>
+            </a:r>
+          </a:p>
+          <a:p>
+            <a:pPr marL="800100" lvl="1" indent="-342900">
+              <a:lnSpc>
+                <a:spcPct val="90000"/>
+              </a:lnSpc>
+              <a:spcAft>
+                <a:spcPts val="600"/>
+              </a:spcAft>
+              <a:buFont typeface="Arial" panose="020B0604020202020204" pitchFamily="34" charset="0"/>
+              <a:buChar char="•"/>
+            </a:pPr>
+            <a:r>
+              <a:rPr lang="en-US" sz="2800" dirty="0">
+                <a:gradFill>
+                  <a:gsLst>
+                    <a:gs pos="2917">
+                      <a:schemeClr val="tx1"/>
+                    </a:gs>
+                    <a:gs pos="30000">
+                      <a:schemeClr val="tx1"/>
+                    </a:gs>
+                  </a:gsLst>
+                  <a:lin ang="5400000" scaled="0"/>
+                </a:gradFill>
+              </a:rPr>
+              <a:t>Profile</a:t>
+            </a:r>
+          </a:p>
+          <a:p>
+            <a:pPr marL="800100" lvl="1" indent="-342900">
+              <a:lnSpc>
+                <a:spcPct val="90000"/>
+              </a:lnSpc>
+              <a:spcAft>
+                <a:spcPts val="600"/>
+              </a:spcAft>
+              <a:buFont typeface="Arial" panose="020B0604020202020204" pitchFamily="34" charset="0"/>
+              <a:buChar char="•"/>
+            </a:pPr>
+            <a:r>
+              <a:rPr lang="en-US" sz="2800" dirty="0">
+                <a:gradFill>
+                  <a:gsLst>
+                    <a:gs pos="2917">
+                      <a:schemeClr val="tx1"/>
+                    </a:gs>
+                    <a:gs pos="30000">
+                      <a:schemeClr val="tx1"/>
+                    </a:gs>
+                  </a:gsLst>
+                  <a:lin ang="5400000" scaled="0"/>
+                </a:gradFill>
+              </a:rPr>
+              <a:t>Questions</a:t>
+            </a:r>
+          </a:p>
+          <a:p>
+            <a:pPr marL="800100" lvl="1" indent="-342900">
+              <a:lnSpc>
+                <a:spcPct val="90000"/>
+              </a:lnSpc>
+              <a:spcAft>
+                <a:spcPts val="600"/>
+              </a:spcAft>
+              <a:buFont typeface="Arial" panose="020B0604020202020204" pitchFamily="34" charset="0"/>
+              <a:buChar char="•"/>
+            </a:pPr>
+            <a:r>
+              <a:rPr lang="en-US" sz="2800" dirty="0">
+                <a:gradFill>
+                  <a:gsLst>
+                    <a:gs pos="2917">
+                      <a:schemeClr val="tx1"/>
+                    </a:gs>
+                    <a:gs pos="30000">
+                      <a:schemeClr val="tx1"/>
+                    </a:gs>
+                  </a:gsLst>
+                  <a:lin ang="5400000" scaled="0"/>
+                </a:gradFill>
+              </a:rPr>
+              <a:t>Pending Questions</a:t>
+            </a:r>
+          </a:p>
+          <a:p>
+            <a:pPr marL="800100" lvl="1" indent="-342900">
+              <a:lnSpc>
+                <a:spcPct val="90000"/>
+              </a:lnSpc>
+              <a:spcAft>
+                <a:spcPts val="600"/>
+              </a:spcAft>
+              <a:buFont typeface="Arial" panose="020B0604020202020204" pitchFamily="34" charset="0"/>
+              <a:buChar char="•"/>
+            </a:pPr>
+            <a:r>
+              <a:rPr lang="en-US" sz="2800" dirty="0">
+                <a:gradFill>
+                  <a:gsLst>
+                    <a:gs pos="2917">
+                      <a:schemeClr val="tx1"/>
+                    </a:gs>
+                    <a:gs pos="30000">
+                      <a:schemeClr val="tx1"/>
+                    </a:gs>
+                  </a:gsLst>
+                  <a:lin ang="5400000" scaled="0"/>
+                </a:gradFill>
+              </a:rPr>
+              <a:t>My Questions</a:t>
+            </a:r>
+          </a:p>
+          <a:p>
+            <a:pPr marL="800100" lvl="1" indent="-342900">
+              <a:lnSpc>
+                <a:spcPct val="90000"/>
+              </a:lnSpc>
+              <a:spcAft>
+                <a:spcPts val="600"/>
+              </a:spcAft>
+              <a:buFont typeface="Arial" panose="020B0604020202020204" pitchFamily="34" charset="0"/>
+              <a:buChar char="•"/>
+            </a:pPr>
+            <a:endParaRPr lang="en-US" sz="2800" dirty="0">
+              <a:gradFill>
+                <a:gsLst>
+                  <a:gs pos="2917">
+                    <a:schemeClr val="tx1"/>
+                  </a:gs>
+                  <a:gs pos="30000">
+                    <a:schemeClr val="tx1"/>
+                  </a:gs>
+                </a:gsLst>
+                <a:lin ang="5400000" scaled="0"/>
+              </a:gradFill>
+            </a:endParaRPr>
+          </a:p>
+          <a:p>
+            <a:pPr marL="342900" indent="-342900">
+              <a:lnSpc>
+                <a:spcPct val="90000"/>
+              </a:lnSpc>
+              <a:spcAft>
+                <a:spcPts val="600"/>
+              </a:spcAft>
+              <a:buFont typeface="Arial" panose="020B0604020202020204" pitchFamily="34" charset="0"/>
+              <a:buChar char="•"/>
+            </a:pPr>
+            <a:endParaRPr lang="en-US" sz="3200" dirty="0">
+              <a:gradFill>
+                <a:gsLst>
+                  <a:gs pos="2917">
+                    <a:schemeClr val="tx1"/>
+                  </a:gs>
+                  <a:gs pos="30000">
+                    <a:schemeClr val="tx1"/>
+                  </a:gs>
+                </a:gsLst>
+                <a:lin ang="5400000" scaled="0"/>
+              </a:gradFill>
+            </a:endParaRPr>
+          </a:p>
+          <a:p>
+            <a:pPr>
+              <a:lnSpc>
+                <a:spcPct val="90000"/>
+              </a:lnSpc>
+              <a:spcAft>
+                <a:spcPts val="600"/>
+              </a:spcAft>
+            </a:pPr>
+            <a:endParaRPr lang="en-US" sz="2000" dirty="0">
+              <a:gradFill>
+                <a:gsLst>
+                  <a:gs pos="2917">
+                    <a:schemeClr val="tx1"/>
+                  </a:gs>
+                  <a:gs pos="30000">
+                    <a:schemeClr val="tx1"/>
+                  </a:gs>
+                </a:gsLst>
+                <a:lin ang="5400000" scaled="0"/>
+              </a:gradFill>
+            </a:endParaRPr>
+          </a:p>
+          <a:p>
+            <a:pPr marL="342900" indent="-342900">
+              <a:lnSpc>
+                <a:spcPct val="90000"/>
+              </a:lnSpc>
+              <a:spcAft>
+                <a:spcPts val="600"/>
+              </a:spcAft>
+              <a:buFont typeface="Arial" panose="020B0604020202020204" pitchFamily="34" charset="0"/>
+              <a:buChar char="•"/>
+            </a:pPr>
+            <a:endParaRPr lang="en-US" sz="2000" dirty="0">
+              <a:gradFill>
+                <a:gsLst>
+                  <a:gs pos="2917">
+                    <a:schemeClr val="tx1"/>
+                  </a:gs>
+                  <a:gs pos="30000">
+                    <a:schemeClr val="tx1"/>
+                  </a:gs>
+                </a:gsLst>
+                <a:lin ang="5400000" scaled="0"/>
+              </a:gradFill>
+            </a:endParaRPr>
+          </a:p>
+        </p:txBody>
+      </p:sp>
+      <p:sp>
+        <p:nvSpPr>
+          <p:cNvPr id="8" name="תיבת טקסט 7">
+            <a:extLst>
+              <a:ext uri="{FF2B5EF4-FFF2-40B4-BE49-F238E27FC236}">
+                <a16:creationId xmlns:a16="http://schemas.microsoft.com/office/drawing/2014/main" id="{01AC8F38-51B7-D73D-0CD3-9A2F14EEB40A}"/>
+              </a:ext>
+            </a:extLst>
+          </p:cNvPr>
+          <p:cNvSpPr txBox="1"/>
+          <p:nvPr/>
+        </p:nvSpPr>
+        <p:spPr>
+          <a:xfrm>
+            <a:off x="656985" y="3845859"/>
+            <a:ext cx="11094098" cy="572464"/>
+          </a:xfrm>
+          <a:prstGeom prst="rect">
+            <a:avLst/>
+          </a:prstGeom>
+          <a:noFill/>
+        </p:spPr>
+        <p:txBody>
+          <a:bodyPr wrap="square" lIns="182880" tIns="146304" rIns="182880" bIns="146304" rtlCol="1">
+            <a:spAutoFit/>
+          </a:bodyPr>
+          <a:lstStyle/>
+          <a:p>
+            <a:pPr>
+              <a:lnSpc>
+                <a:spcPct val="90000"/>
+              </a:lnSpc>
+              <a:spcAft>
+                <a:spcPts val="600"/>
+              </a:spcAft>
+            </a:pPr>
+            <a:endParaRPr lang="en-US" sz="2000" dirty="0">
+              <a:gradFill>
+                <a:gsLst>
+                  <a:gs pos="2917">
+                    <a:schemeClr val="tx1"/>
+                  </a:gs>
+                  <a:gs pos="30000">
+                    <a:schemeClr val="tx1"/>
+                  </a:gs>
+                </a:gsLst>
+                <a:lin ang="5400000" scaled="0"/>
+              </a:gradFill>
+            </a:endParaRPr>
+          </a:p>
+        </p:txBody>
+      </p:sp>
+    </p:spTree>
+    <p:extLst>
+      <p:ext uri="{BB962C8B-B14F-4D97-AF65-F5344CB8AC3E}">
+        <p14:creationId xmlns:p14="http://schemas.microsoft.com/office/powerpoint/2010/main" val="3274342029"/>
       </p:ext>
     </p:extLst>
   </p:cSld>
@@ -8315,12 +9381,21 @@
 </file>
 
 <file path=customXml/item1.xml><?xml version="1.0" encoding="utf-8"?>
-<?mso-contentType ?>
-<FormTemplates xmlns="http://schemas.microsoft.com/sharepoint/v3/contenttype/forms">
-  <Display>DocumentLibraryForm</Display>
-  <Edit>DocumentLibraryForm</Edit>
-  <New>DocumentLibraryForm</New>
-</FormTemplates>
+<p:properties xmlns:p="http://schemas.microsoft.com/office/2006/metadata/properties" xmlns:xsi="http://www.w3.org/2001/XMLSchema-instance" xmlns:pc="http://schemas.microsoft.com/office/infopath/2007/PartnerControls">
+  <documentManagement>
+    <_ip_UnifiedCompliancePolicyProperties xmlns="http://schemas.microsoft.com/sharepoint/v3" xsi:nil="true"/>
+    <_ip_UnifiedCompliancePolicyUIAction xmlns="http://schemas.microsoft.com/sharepoint/v3" xsi:nil="true"/>
+    <LastSharedByUser xmlns="11245976-3b4d-4794-a754-317688483df2">jogallow@microsoft.com</LastSharedByUser>
+    <SharedWithUsers xmlns="11245976-3b4d-4794-a754-317688483df2">
+      <UserInfo>
+        <DisplayName>Martin Woodward</DisplayName>
+        <AccountId>67</AccountId>
+        <AccountType/>
+      </UserInfo>
+    </SharedWithUsers>
+    <LastSharedByTime xmlns="11245976-3b4d-4794-a754-317688483df2">2018-03-16T04:12:59+00:00</LastSharedByTime>
+  </documentManagement>
+</p:properties>
 </file>
 
 <file path=customXml/item2.xml><?xml version="1.0" encoding="utf-8"?>
@@ -8564,27 +9639,21 @@
 </file>
 
 <file path=customXml/item3.xml><?xml version="1.0" encoding="utf-8"?>
-<p:properties xmlns:p="http://schemas.microsoft.com/office/2006/metadata/properties" xmlns:xsi="http://www.w3.org/2001/XMLSchema-instance" xmlns:pc="http://schemas.microsoft.com/office/infopath/2007/PartnerControls">
-  <documentManagement>
-    <_ip_UnifiedCompliancePolicyProperties xmlns="http://schemas.microsoft.com/sharepoint/v3" xsi:nil="true"/>
-    <_ip_UnifiedCompliancePolicyUIAction xmlns="http://schemas.microsoft.com/sharepoint/v3" xsi:nil="true"/>
-    <LastSharedByUser xmlns="11245976-3b4d-4794-a754-317688483df2">jogallow@microsoft.com</LastSharedByUser>
-    <SharedWithUsers xmlns="11245976-3b4d-4794-a754-317688483df2">
-      <UserInfo>
-        <DisplayName>Martin Woodward</DisplayName>
-        <AccountId>67</AccountId>
-        <AccountType/>
-      </UserInfo>
-    </SharedWithUsers>
-    <LastSharedByTime xmlns="11245976-3b4d-4794-a754-317688483df2">2018-03-16T04:12:59+00:00</LastSharedByTime>
-  </documentManagement>
-</p:properties>
+<?mso-contentType ?>
+<FormTemplates xmlns="http://schemas.microsoft.com/sharepoint/v3/contenttype/forms">
+  <Display>DocumentLibraryForm</Display>
+  <Edit>DocumentLibraryForm</Edit>
+  <New>DocumentLibraryForm</New>
+</FormTemplates>
 </file>
 
 <file path=customXml/itemProps1.xml><?xml version="1.0" encoding="utf-8"?>
-<ds:datastoreItem xmlns:ds="http://schemas.openxmlformats.org/officeDocument/2006/customXml" ds:itemID="{093821A7-5528-48BE-BD00-067FBFDD28D5}">
+<ds:datastoreItem xmlns:ds="http://schemas.openxmlformats.org/officeDocument/2006/customXml" ds:itemID="{D23E43D6-DB2F-4C33-A8C8-D28F777A5DE7}">
   <ds:schemaRefs>
-    <ds:schemaRef ds:uri="http://schemas.microsoft.com/sharepoint/v3/contenttype/forms"/>
+    <ds:schemaRef ds:uri="http://schemas.microsoft.com/office/2006/metadata/properties"/>
+    <ds:schemaRef ds:uri="http://schemas.microsoft.com/office/infopath/2007/PartnerControls"/>
+    <ds:schemaRef ds:uri="http://schemas.microsoft.com/sharepoint/v3"/>
+    <ds:schemaRef ds:uri="11245976-3b4d-4794-a754-317688483df2"/>
   </ds:schemaRefs>
 </ds:datastoreItem>
 </file>
@@ -8610,12 +9679,9 @@
 </file>
 
 <file path=customXml/itemProps3.xml><?xml version="1.0" encoding="utf-8"?>
-<ds:datastoreItem xmlns:ds="http://schemas.openxmlformats.org/officeDocument/2006/customXml" ds:itemID="{D23E43D6-DB2F-4C33-A8C8-D28F777A5DE7}">
+<ds:datastoreItem xmlns:ds="http://schemas.openxmlformats.org/officeDocument/2006/customXml" ds:itemID="{093821A7-5528-48BE-BD00-067FBFDD28D5}">
   <ds:schemaRefs>
-    <ds:schemaRef ds:uri="http://schemas.microsoft.com/office/2006/metadata/properties"/>
-    <ds:schemaRef ds:uri="http://schemas.microsoft.com/office/infopath/2007/PartnerControls"/>
-    <ds:schemaRef ds:uri="http://schemas.microsoft.com/sharepoint/v3"/>
-    <ds:schemaRef ds:uri="11245976-3b4d-4794-a754-317688483df2"/>
+    <ds:schemaRef ds:uri="http://schemas.microsoft.com/sharepoint/v3/contenttype/forms"/>
   </ds:schemaRefs>
 </ds:datastoreItem>
 </file>
</xml_diff>